<commit_message>
minor typo and add pdf version of ppt
</commit_message>
<xml_diff>
--- a/Energy Solar ppt final version.pptx
+++ b/Energy Solar ppt final version.pptx
@@ -7134,7 +7134,23 @@
                   <a:schemeClr val="dk1"/>
                 </a:solidFill>
               </a:rPr>
-              <a:t>You can find our fully analysis at</a:t>
+              <a:t>You can find </a:t>
+            </a:r>
+            <a:r>
+              <a:rPr lang="en-US" sz="1800">
+                <a:solidFill>
+                  <a:schemeClr val="dk1"/>
+                </a:solidFill>
+              </a:rPr>
+              <a:t>our full </a:t>
+            </a:r>
+            <a:r>
+              <a:rPr lang="en-US" sz="1800" dirty="0">
+                <a:solidFill>
+                  <a:schemeClr val="dk1"/>
+                </a:solidFill>
+              </a:rPr>
+              <a:t>analysis at</a:t>
             </a:r>
           </a:p>
           <a:p>

</xml_diff>

<commit_message>
add references to ppt
</commit_message>
<xml_diff>
--- a/Energy Solar ppt final version.pptx
+++ b/Energy Solar ppt final version.pptx
@@ -5,7 +5,7 @@
     <p:sldMasterId id="2147483658" r:id="rId1"/>
   </p:sldMasterIdLst>
   <p:notesMasterIdLst>
-    <p:notesMasterId r:id="rId14"/>
+    <p:notesMasterId r:id="rId15"/>
   </p:notesMasterIdLst>
   <p:sldIdLst>
     <p:sldId id="256" r:id="rId2"/>
@@ -19,24 +19,25 @@
     <p:sldId id="297" r:id="rId10"/>
     <p:sldId id="298" r:id="rId11"/>
     <p:sldId id="302" r:id="rId12"/>
-    <p:sldId id="280" r:id="rId13"/>
+    <p:sldId id="304" r:id="rId13"/>
+    <p:sldId id="280" r:id="rId14"/>
   </p:sldIdLst>
   <p:sldSz cx="9144000" cy="5143500" type="screen16x9"/>
   <p:notesSz cx="6858000" cy="9144000"/>
   <p:embeddedFontLst>
     <p:embeddedFont>
       <p:font typeface="Lora" pitchFamily="2" charset="77"/>
-      <p:regular r:id="rId15"/>
-      <p:bold r:id="rId16"/>
-      <p:italic r:id="rId17"/>
-      <p:boldItalic r:id="rId18"/>
+      <p:regular r:id="rId16"/>
+      <p:bold r:id="rId17"/>
+      <p:italic r:id="rId18"/>
+      <p:boldItalic r:id="rId19"/>
     </p:embeddedFont>
     <p:embeddedFont>
       <p:font typeface="Quattrocento Sans" panose="020B0802050000020003" pitchFamily="34" charset="0"/>
-      <p:regular r:id="rId19"/>
-      <p:bold r:id="rId20"/>
-      <p:italic r:id="rId21"/>
-      <p:boldItalic r:id="rId22"/>
+      <p:regular r:id="rId20"/>
+      <p:bold r:id="rId21"/>
+      <p:italic r:id="rId22"/>
+      <p:boldItalic r:id="rId23"/>
     </p:embeddedFont>
   </p:embeddedFontLst>
   <p:defaultTextStyle>
@@ -6964,10 +6965,10 @@
       </p:sp>
       <p:sp>
         <p:nvSpPr>
-          <p:cNvPr id="2" name="TextBox 1">
+          <p:cNvPr id="4" name="TextBox 3">
             <a:extLst>
               <a:ext uri="{FF2B5EF4-FFF2-40B4-BE49-F238E27FC236}">
-                <a16:creationId xmlns:a16="http://schemas.microsoft.com/office/drawing/2014/main" id="{BD7E8E76-7794-1A41-8F82-841CDF8BAA30}"/>
+                <a16:creationId xmlns:a16="http://schemas.microsoft.com/office/drawing/2014/main" id="{42FBC4DB-BEAB-FB48-BBE6-B9F89D8757D7}"/>
               </a:ext>
             </a:extLst>
           </p:cNvPr>
@@ -6976,8 +6977,8 @@
         </p:nvSpPr>
         <p:spPr>
           <a:xfrm>
-            <a:off x="6012145" y="4338569"/>
-            <a:ext cx="841897" cy="261610"/>
+            <a:off x="5109945" y="3543568"/>
+            <a:ext cx="3504486" cy="307777"/>
           </a:xfrm>
           <a:prstGeom prst="rect">
             <a:avLst/>
@@ -6991,17 +6992,38 @@
           <a:lstStyle/>
           <a:p>
             <a:r>
+              <a:rPr lang="en-US" sz="1000" dirty="0"/>
+              <a:t> </a:t>
+            </a:r>
+            <a:r>
+              <a:rPr lang="en-US" sz="1000" b="1" dirty="0">
+                <a:hlinkClick r:id="rId3" tooltip="Posts by Jason Brownlee"/>
+              </a:rPr>
+              <a:t>Jason Brownlee</a:t>
+            </a:r>
+            <a:r>
+              <a:rPr lang="en-US" sz="1000" b="1" dirty="0"/>
+              <a:t>:</a:t>
+            </a:r>
+            <a:r>
+              <a:rPr lang="en-US" b="1" dirty="0"/>
+              <a:t> </a:t>
+            </a:r>
+            <a:r>
               <a:rPr lang="en-US" sz="1100" dirty="0">
                 <a:latin typeface="Lora"/>
                 <a:sym typeface="Lora"/>
-                <a:hlinkClick r:id="rId3"/>
+                <a:hlinkClick r:id="rId4"/>
               </a:rPr>
-              <a:t>Time Series</a:t>
-            </a:r>
-            <a:endParaRPr lang="en-US" sz="1100" dirty="0">
-              <a:latin typeface="Lora"/>
-              <a:sym typeface="Lora"/>
-            </a:endParaRPr>
+              <a:t>What is Time Serie Forecasting?</a:t>
+            </a:r>
+            <a:r>
+              <a:rPr lang="en-US" sz="1100" dirty="0">
+                <a:latin typeface="Lora"/>
+                <a:sym typeface="Lora"/>
+              </a:rPr>
+              <a:t> </a:t>
+            </a:r>
           </a:p>
         </p:txBody>
       </p:sp>
@@ -7019,6 +7041,213 @@
 </file>
 
 <file path=ppt/slides/slide12.xml><?xml version="1.0" encoding="utf-8"?>
+<p:sld xmlns:a="http://schemas.openxmlformats.org/drawingml/2006/main" xmlns:r="http://schemas.openxmlformats.org/officeDocument/2006/relationships" xmlns:p="http://schemas.openxmlformats.org/presentationml/2006/main">
+  <p:cSld>
+    <p:spTree>
+      <p:nvGrpSpPr>
+        <p:cNvPr id="1" name=""/>
+        <p:cNvGrpSpPr/>
+        <p:nvPr/>
+      </p:nvGrpSpPr>
+      <p:grpSpPr>
+        <a:xfrm>
+          <a:off x="0" y="0"/>
+          <a:ext cx="0" cy="0"/>
+          <a:chOff x="0" y="0"/>
+          <a:chExt cx="0" cy="0"/>
+        </a:xfrm>
+      </p:grpSpPr>
+      <p:sp>
+        <p:nvSpPr>
+          <p:cNvPr id="2" name="Title 1">
+            <a:extLst>
+              <a:ext uri="{FF2B5EF4-FFF2-40B4-BE49-F238E27FC236}">
+                <a16:creationId xmlns:a16="http://schemas.microsoft.com/office/drawing/2014/main" id="{FE0CA496-A4FE-2545-A8BF-D6B8492F380B}"/>
+              </a:ext>
+            </a:extLst>
+          </p:cNvPr>
+          <p:cNvSpPr>
+            <a:spLocks noGrp="1"/>
+          </p:cNvSpPr>
+          <p:nvPr>
+            <p:ph type="title"/>
+          </p:nvPr>
+        </p:nvSpPr>
+        <p:spPr/>
+        <p:txBody>
+          <a:bodyPr/>
+          <a:lstStyle/>
+          <a:p>
+            <a:r>
+              <a:rPr lang="en-US" dirty="0"/>
+              <a:t>References</a:t>
+            </a:r>
+          </a:p>
+        </p:txBody>
+      </p:sp>
+      <p:sp>
+        <p:nvSpPr>
+          <p:cNvPr id="3" name="Text Placeholder 2">
+            <a:extLst>
+              <a:ext uri="{FF2B5EF4-FFF2-40B4-BE49-F238E27FC236}">
+                <a16:creationId xmlns:a16="http://schemas.microsoft.com/office/drawing/2014/main" id="{C3B6E683-5892-8145-8ACD-8D14B88F7D12}"/>
+              </a:ext>
+            </a:extLst>
+          </p:cNvPr>
+          <p:cNvSpPr>
+            <a:spLocks noGrp="1"/>
+          </p:cNvSpPr>
+          <p:nvPr>
+            <p:ph type="body" idx="1"/>
+          </p:nvPr>
+        </p:nvSpPr>
+        <p:spPr>
+          <a:xfrm>
+            <a:off x="1381249" y="1618700"/>
+            <a:ext cx="7425293" cy="3231000"/>
+          </a:xfrm>
+        </p:spPr>
+        <p:txBody>
+          <a:bodyPr/>
+          <a:lstStyle/>
+          <a:p>
+            <a:r>
+              <a:rPr lang="en-US" sz="1200" dirty="0"/>
+              <a:t>Solar Energy Consumption by the residential sector from </a:t>
+            </a:r>
+            <a:r>
+              <a:rPr lang="en-US" sz="1200" dirty="0">
+                <a:hlinkClick r:id="rId2"/>
+              </a:rPr>
+              <a:t>U.S. Energy Information Administration</a:t>
+            </a:r>
+            <a:endParaRPr lang="en-US" sz="1200" dirty="0"/>
+          </a:p>
+          <a:p>
+            <a:r>
+              <a:rPr lang="en-US" sz="1200" dirty="0"/>
+              <a:t>Residential Energy Demand Temperature Index (REDTI) from </a:t>
+            </a:r>
+            <a:r>
+              <a:rPr lang="en-US" sz="1200" dirty="0">
+                <a:hlinkClick r:id="rId3"/>
+              </a:rPr>
+              <a:t>NOAA National Oceanic and Atmospheric Administration</a:t>
+            </a:r>
+            <a:endParaRPr lang="en-US" sz="1200" dirty="0"/>
+          </a:p>
+          <a:p>
+            <a:r>
+              <a:rPr lang="en-US" sz="1200" dirty="0"/>
+              <a:t>Average Retail Price of Residential Electricity from </a:t>
+            </a:r>
+            <a:r>
+              <a:rPr lang="en-US" sz="1200" dirty="0">
+                <a:hlinkClick r:id="rId4"/>
+              </a:rPr>
+              <a:t>U.S. Energy Information Administration</a:t>
+            </a:r>
+            <a:endParaRPr lang="en-US" sz="1200" dirty="0"/>
+          </a:p>
+          <a:p>
+            <a:r>
+              <a:rPr lang="en-US" sz="1200" dirty="0"/>
+              <a:t>Time Series concept: </a:t>
+            </a:r>
+            <a:r>
+              <a:rPr lang="en-US" sz="1200" dirty="0">
+                <a:hlinkClick r:id="rId5"/>
+              </a:rPr>
+              <a:t>https://machinelearningmastery.com/time-series-forecasting/</a:t>
+            </a:r>
+            <a:endParaRPr lang="en-US" sz="1200" dirty="0"/>
+          </a:p>
+          <a:p>
+            <a:r>
+              <a:rPr lang="en-US" sz="1200" dirty="0"/>
+              <a:t>Data analysis study: </a:t>
+            </a:r>
+            <a:r>
+              <a:rPr lang="en-US" sz="1200" dirty="0">
+                <a:hlinkClick r:id="rId6"/>
+              </a:rPr>
+              <a:t>https://github.com/Arronno/House-Prices--Advanced-Regression-Techniques-/blob/master/AI-0009-Report.ipynb</a:t>
+            </a:r>
+            <a:endParaRPr lang="en-US" sz="1200" dirty="0"/>
+          </a:p>
+          <a:p>
+            <a:r>
+              <a:rPr lang="en-US" sz="1200" dirty="0"/>
+              <a:t>Use of Autoregression: </a:t>
+            </a:r>
+            <a:r>
+              <a:rPr lang="en-US" sz="1200" dirty="0">
+                <a:hlinkClick r:id="rId7"/>
+              </a:rPr>
+              <a:t>https://machinelearningmastery.com/autoregression-models-time-series-forecasting-python/</a:t>
+            </a:r>
+            <a:endParaRPr lang="en-US" sz="1200" dirty="0"/>
+          </a:p>
+          <a:p>
+            <a:r>
+              <a:rPr lang="en-US" sz="1200" dirty="0"/>
+              <a:t>Reference study: </a:t>
+            </a:r>
+            <a:r>
+              <a:rPr lang="en-US" sz="1200" dirty="0">
+                <a:hlinkClick r:id="rId8"/>
+              </a:rPr>
+              <a:t>https://github.com/Azure/cortana-intelligence-energy-demand-forecasting</a:t>
+            </a:r>
+            <a:endParaRPr lang="en-US" sz="1200" dirty="0"/>
+          </a:p>
+          <a:p>
+            <a:r>
+              <a:rPr lang="en-US" sz="1200" dirty="0"/>
+              <a:t>Use of Multi Layer Perceptron Regressor: </a:t>
+            </a:r>
+            <a:r>
+              <a:rPr lang="en-US" sz="1200" dirty="0">
+                <a:hlinkClick r:id="rId9"/>
+              </a:rPr>
+              <a:t>https://www.programcreek.com/python/example/93778/sklearn.neural_network.MLPRegressor</a:t>
+            </a:r>
+            <a:endParaRPr lang="en-US" sz="1200" dirty="0"/>
+          </a:p>
+          <a:p>
+            <a:r>
+              <a:rPr lang="en-US" sz="1200" dirty="0"/>
+              <a:t>Lag and Peek data manipulation credit Matthew Young from Crypto currency forecasting </a:t>
+            </a:r>
+          </a:p>
+          <a:p>
+            <a:endParaRPr lang="en-US" sz="1600" dirty="0"/>
+          </a:p>
+          <a:p>
+            <a:endParaRPr lang="en-US" dirty="0"/>
+          </a:p>
+          <a:p>
+            <a:endParaRPr lang="en-US" dirty="0"/>
+          </a:p>
+          <a:p>
+            <a:endParaRPr lang="en-US" dirty="0"/>
+          </a:p>
+        </p:txBody>
+      </p:sp>
+    </p:spTree>
+    <p:extLst>
+      <p:ext uri="{BB962C8B-B14F-4D97-AF65-F5344CB8AC3E}">
+        <p14:creationId xmlns:p14="http://schemas.microsoft.com/office/powerpoint/2010/main" val="1644122253"/>
+      </p:ext>
+    </p:extLst>
+  </p:cSld>
+  <p:clrMapOvr>
+    <a:masterClrMapping/>
+  </p:clrMapOvr>
+</p:sld>
+</file>
+
+<file path=ppt/slides/slide13.xml><?xml version="1.0" encoding="utf-8"?>
 <p:sld xmlns:a="http://schemas.openxmlformats.org/drawingml/2006/main" xmlns:r="http://schemas.openxmlformats.org/officeDocument/2006/relationships" xmlns:p="http://schemas.openxmlformats.org/presentationml/2006/main">
   <p:cSld>
     <p:spTree>
@@ -9093,8 +9322,8 @@
         </p:nvSpPr>
         <p:spPr>
           <a:xfrm>
-            <a:off x="6633945" y="4523283"/>
-            <a:ext cx="841897" cy="348203"/>
+            <a:off x="5109945" y="3543568"/>
+            <a:ext cx="3504486" cy="307777"/>
           </a:xfrm>
           <a:prstGeom prst="rect">
             <a:avLst/>
@@ -9108,17 +9337,38 @@
           <a:lstStyle/>
           <a:p>
             <a:r>
+              <a:rPr lang="en-US" sz="1000" dirty="0"/>
+              <a:t> </a:t>
+            </a:r>
+            <a:r>
+              <a:rPr lang="en-US" sz="1000" b="1" dirty="0">
+                <a:hlinkClick r:id="rId3" tooltip="Posts by Jason Brownlee"/>
+              </a:rPr>
+              <a:t>Jason Brownlee</a:t>
+            </a:r>
+            <a:r>
+              <a:rPr lang="en-US" sz="1000" b="1" dirty="0"/>
+              <a:t>:</a:t>
+            </a:r>
+            <a:r>
+              <a:rPr lang="en-US" b="1" dirty="0"/>
+              <a:t> </a:t>
+            </a:r>
+            <a:r>
               <a:rPr lang="en-US" sz="1100" dirty="0">
                 <a:latin typeface="Lora"/>
                 <a:sym typeface="Lora"/>
-                <a:hlinkClick r:id="rId3"/>
+                <a:hlinkClick r:id="rId4"/>
               </a:rPr>
-              <a:t>Time Series</a:t>
-            </a:r>
-            <a:endParaRPr lang="en-US" sz="1100" dirty="0">
-              <a:latin typeface="Lora"/>
-              <a:sym typeface="Lora"/>
-            </a:endParaRPr>
+              <a:t>What is Time Serie Forecasting?</a:t>
+            </a:r>
+            <a:r>
+              <a:rPr lang="en-US" sz="1100" dirty="0">
+                <a:latin typeface="Lora"/>
+                <a:sym typeface="Lora"/>
+              </a:rPr>
+              <a:t> </a:t>
+            </a:r>
           </a:p>
         </p:txBody>
       </p:sp>
@@ -10023,10 +10273,10 @@
       </p:sp>
       <p:sp>
         <p:nvSpPr>
-          <p:cNvPr id="2" name="TextBox 1">
+          <p:cNvPr id="5" name="TextBox 4">
             <a:extLst>
               <a:ext uri="{FF2B5EF4-FFF2-40B4-BE49-F238E27FC236}">
-                <a16:creationId xmlns:a16="http://schemas.microsoft.com/office/drawing/2014/main" id="{BD7E8E76-7794-1A41-8F82-841CDF8BAA30}"/>
+                <a16:creationId xmlns:a16="http://schemas.microsoft.com/office/drawing/2014/main" id="{7DBA121E-B455-3A41-8C7C-75EE14EF115D}"/>
               </a:ext>
             </a:extLst>
           </p:cNvPr>
@@ -10035,8 +10285,8 @@
         </p:nvSpPr>
         <p:spPr>
           <a:xfrm>
-            <a:off x="6218973" y="4610712"/>
-            <a:ext cx="841897" cy="261610"/>
+            <a:off x="5109945" y="3543568"/>
+            <a:ext cx="3504486" cy="307777"/>
           </a:xfrm>
           <a:prstGeom prst="rect">
             <a:avLst/>
@@ -10050,17 +10300,38 @@
           <a:lstStyle/>
           <a:p>
             <a:r>
+              <a:rPr lang="en-US" sz="1000" dirty="0"/>
+              <a:t> </a:t>
+            </a:r>
+            <a:r>
+              <a:rPr lang="en-US" sz="1000" b="1" dirty="0">
+                <a:hlinkClick r:id="rId3" tooltip="Posts by Jason Brownlee"/>
+              </a:rPr>
+              <a:t>Jason Brownlee</a:t>
+            </a:r>
+            <a:r>
+              <a:rPr lang="en-US" sz="1000" b="1" dirty="0"/>
+              <a:t>:</a:t>
+            </a:r>
+            <a:r>
+              <a:rPr lang="en-US" b="1" dirty="0"/>
+              <a:t> </a:t>
+            </a:r>
+            <a:r>
               <a:rPr lang="en-US" sz="1100" dirty="0">
                 <a:latin typeface="Lora"/>
                 <a:sym typeface="Lora"/>
-                <a:hlinkClick r:id="rId3"/>
+                <a:hlinkClick r:id="rId4"/>
               </a:rPr>
-              <a:t>Time Series</a:t>
-            </a:r>
-            <a:endParaRPr lang="en-US" sz="1100" dirty="0">
-              <a:latin typeface="Lora"/>
-              <a:sym typeface="Lora"/>
-            </a:endParaRPr>
+              <a:t>What is Time Serie Forecasting?</a:t>
+            </a:r>
+            <a:r>
+              <a:rPr lang="en-US" sz="1100" dirty="0">
+                <a:latin typeface="Lora"/>
+                <a:sym typeface="Lora"/>
+              </a:rPr>
+              <a:t> </a:t>
+            </a:r>
           </a:p>
         </p:txBody>
       </p:sp>
@@ -12798,25 +13069,15 @@
             <a:pPr algn="just"/>
             <a:r>
               <a:rPr lang="en-US" sz="1800" i="1" dirty="0"/>
-              <a:t>Multi-layer Perceptron </a:t>
-            </a:r>
-            <a:r>
-              <a:rPr lang="en-US" sz="1800" i="1" dirty="0" err="1"/>
-              <a:t>Regressor</a:t>
-            </a:r>
-            <a:endParaRPr lang="en-US" sz="1800" i="1" dirty="0"/>
+              <a:t>Multi-layer Perceptron Regressor</a:t>
+            </a:r>
           </a:p>
           <a:p>
             <a:pPr algn="just"/>
             <a:r>
               <a:rPr lang="en-US" sz="1800" i="1" dirty="0"/>
-              <a:t>Random Forest </a:t>
-            </a:r>
-            <a:r>
-              <a:rPr lang="en-US" sz="1800" i="1" dirty="0" err="1"/>
-              <a:t>Regressor</a:t>
-            </a:r>
-            <a:endParaRPr lang="en-US" sz="1800" i="1" dirty="0"/>
+              <a:t>Random Forest Regressor</a:t>
+            </a:r>
           </a:p>
           <a:p>
             <a:endParaRPr lang="en-US" sz="1800" dirty="0"/>

</xml_diff>

<commit_message>
add team to ppt
</commit_message>
<xml_diff>
--- a/Energy Solar ppt final version.pptx
+++ b/Energy Solar ppt final version.pptx
@@ -5596,6 +5596,62 @@
           </a:prstGeom>
         </p:spPr>
       </p:pic>
+      <p:sp>
+        <p:nvSpPr>
+          <p:cNvPr id="2" name="TextBox 1">
+            <a:extLst>
+              <a:ext uri="{FF2B5EF4-FFF2-40B4-BE49-F238E27FC236}">
+                <a16:creationId xmlns:a16="http://schemas.microsoft.com/office/drawing/2014/main" id="{50B29915-ED5A-CE4E-B1D7-D8EB17702454}"/>
+              </a:ext>
+            </a:extLst>
+          </p:cNvPr>
+          <p:cNvSpPr txBox="1"/>
+          <p:nvPr/>
+        </p:nvSpPr>
+        <p:spPr>
+          <a:xfrm>
+            <a:off x="5617029" y="3951515"/>
+            <a:ext cx="3223959" cy="1169551"/>
+          </a:xfrm>
+          <a:prstGeom prst="rect">
+            <a:avLst/>
+          </a:prstGeom>
+          <a:noFill/>
+        </p:spPr>
+        <p:txBody>
+          <a:bodyPr wrap="none" rtlCol="0">
+            <a:spAutoFit/>
+          </a:bodyPr>
+          <a:lstStyle/>
+          <a:p>
+            <a:r>
+              <a:rPr lang="en-US" dirty="0"/>
+              <a:t>Manuela Machado</a:t>
+            </a:r>
+          </a:p>
+          <a:p>
+            <a:r>
+              <a:rPr lang="en-US" dirty="0"/>
+              <a:t>Guirlyn Olivar</a:t>
+            </a:r>
+          </a:p>
+          <a:p>
+            <a:endParaRPr lang="en-US" dirty="0"/>
+          </a:p>
+          <a:p>
+            <a:r>
+              <a:rPr lang="en-US" dirty="0"/>
+              <a:t>UC Berkeley Extension Data Analytics</a:t>
+            </a:r>
+          </a:p>
+          <a:p>
+            <a:r>
+              <a:rPr lang="en-US" dirty="0"/>
+              <a:t>July 2018</a:t>
+            </a:r>
+          </a:p>
+        </p:txBody>
+      </p:sp>
     </p:spTree>
   </p:cSld>
   <p:clrMapOvr>

</xml_diff>